<commit_message>
Renamed to hello world
</commit_message>
<xml_diff>
--- a/TypeSafeWebDevWithYesodAndHaskell.pptx
+++ b/TypeSafeWebDevWithYesodAndHaskell.pptx
@@ -7918,6 +7918,13 @@
   <p:clrMapOvr>
     <a:masterClrMapping/>
   </p:clrMapOvr>
+  <p:timing>
+    <p:tnLst>
+      <p:par>
+        <p:cTn xmlns:p14="http://schemas.microsoft.com/office/powerpoint/2010/main" id="1" dur="indefinite" restart="never" nodeType="tmRoot"/>
+      </p:par>
+    </p:tnLst>
+  </p:timing>
 </p:sld>
 </file>
 
@@ -15027,12 +15034,13 @@
               <a:rPr lang="en-AU" dirty="0" smtClean="0">
                 <a:hlinkClick r:id="rId2"/>
               </a:rPr>
-              <a:t>http://localhost:3002/</a:t>
+              <a:t>http://localhost:3002/notes</a:t>
             </a:r>
             <a:r>
               <a:rPr lang="en-AU" dirty="0" smtClean="0"/>
               <a:t> </a:t>
             </a:r>
+            <a:endParaRPr lang="en-AU" dirty="0" smtClean="0"/>
           </a:p>
           <a:p>
             <a:r>
@@ -18121,13 +18129,7 @@
               <a:rPr lang="en-AU" sz="1800" dirty="0" smtClean="0">
                 <a:cs typeface="Andale Mono"/>
               </a:rPr>
-              <a:t> offside </a:t>
-            </a:r>
-            <a:r>
-              <a:rPr lang="en-AU" sz="1800" smtClean="0">
-                <a:cs typeface="Andale Mono"/>
-              </a:rPr>
-              <a:t>indentation rule.</a:t>
+              <a:t> offside indentation rule.</a:t>
             </a:r>
             <a:endParaRPr lang="en-AU" sz="1800" dirty="0" smtClean="0">
               <a:cs typeface="Andale Mono"/>
@@ -23082,6 +23084,13 @@
   <p:clrMapOvr>
     <a:masterClrMapping/>
   </p:clrMapOvr>
+  <p:timing>
+    <p:tnLst>
+      <p:par>
+        <p:cTn xmlns:p14="http://schemas.microsoft.com/office/powerpoint/2010/main" id="1" dur="indefinite" restart="never" nodeType="tmRoot"/>
+      </p:par>
+    </p:tnLst>
+  </p:timing>
 </p:sld>
 </file>
 
@@ -24856,6 +24865,13 @@
   <p:clrMapOvr>
     <a:masterClrMapping/>
   </p:clrMapOvr>
+  <p:timing>
+    <p:tnLst>
+      <p:par>
+        <p:cTn xmlns:p14="http://schemas.microsoft.com/office/powerpoint/2010/main" id="1" dur="indefinite" restart="never" nodeType="tmRoot"/>
+      </p:par>
+    </p:tnLst>
+  </p:timing>
 </p:sld>
 </file>
 
@@ -26580,6 +26596,13 @@
   <p:clrMapOvr>
     <a:masterClrMapping/>
   </p:clrMapOvr>
+  <p:timing>
+    <p:tnLst>
+      <p:par>
+        <p:cTn xmlns:p14="http://schemas.microsoft.com/office/powerpoint/2010/main" id="1" dur="indefinite" restart="never" nodeType="tmRoot"/>
+      </p:par>
+    </p:tnLst>
+  </p:timing>
 </p:sld>
 </file>
 
@@ -27016,6 +27039,13 @@
   <p:clrMapOvr>
     <a:masterClrMapping/>
   </p:clrMapOvr>
+  <p:timing>
+    <p:tnLst>
+      <p:par>
+        <p:cTn xmlns:p14="http://schemas.microsoft.com/office/powerpoint/2010/main" id="1" dur="indefinite" restart="never" nodeType="tmRoot"/>
+      </p:par>
+    </p:tnLst>
+  </p:timing>
 </p:sld>
 </file>
 
@@ -27364,6 +27394,13 @@
   <p:clrMapOvr>
     <a:masterClrMapping/>
   </p:clrMapOvr>
+  <p:timing>
+    <p:tnLst>
+      <p:par>
+        <p:cTn xmlns:p14="http://schemas.microsoft.com/office/powerpoint/2010/main" id="1" dur="indefinite" restart="never" nodeType="tmRoot"/>
+      </p:par>
+    </p:tnLst>
+  </p:timing>
 </p:sld>
 </file>
 
@@ -28061,6 +28098,13 @@
   <p:clrMapOvr>
     <a:masterClrMapping/>
   </p:clrMapOvr>
+  <p:timing>
+    <p:tnLst>
+      <p:par>
+        <p:cTn xmlns:p14="http://schemas.microsoft.com/office/powerpoint/2010/main" id="1" dur="indefinite" restart="never" nodeType="tmRoot"/>
+      </p:par>
+    </p:tnLst>
+  </p:timing>
 </p:sld>
 </file>
 
@@ -28313,6 +28357,13 @@
   <p:clrMapOvr>
     <a:masterClrMapping/>
   </p:clrMapOvr>
+  <p:timing>
+    <p:tnLst>
+      <p:par>
+        <p:cTn xmlns:p14="http://schemas.microsoft.com/office/powerpoint/2010/main" id="1" dur="indefinite" restart="never" nodeType="tmRoot"/>
+      </p:par>
+    </p:tnLst>
+  </p:timing>
 </p:sld>
 </file>
 
@@ -28397,6 +28448,13 @@
   <p:clrMapOvr>
     <a:masterClrMapping/>
   </p:clrMapOvr>
+  <p:timing>
+    <p:tnLst>
+      <p:par>
+        <p:cTn xmlns:p14="http://schemas.microsoft.com/office/powerpoint/2010/main" id="1" dur="indefinite" restart="never" nodeType="tmRoot"/>
+      </p:par>
+    </p:tnLst>
+  </p:timing>
 </p:sld>
 </file>
 

</xml_diff>

<commit_message>
Last changes before the real thing!!!
</commit_message>
<xml_diff>
--- a/TypeSafeWebDevWithYesodAndHaskell.pptx
+++ b/TypeSafeWebDevWithYesodAndHaskell.pptx
@@ -5,7 +5,7 @@
     <p:sldMasterId id="2147483660" r:id="rId1"/>
   </p:sldMasterIdLst>
   <p:notesMasterIdLst>
-    <p:notesMasterId r:id="rId63"/>
+    <p:notesMasterId r:id="rId64"/>
   </p:notesMasterIdLst>
   <p:sldIdLst>
     <p:sldId id="256" r:id="rId2"/>
@@ -66,9 +66,10 @@
     <p:sldId id="307" r:id="rId57"/>
     <p:sldId id="321" r:id="rId58"/>
     <p:sldId id="322" r:id="rId59"/>
-    <p:sldId id="292" r:id="rId60"/>
-    <p:sldId id="295" r:id="rId61"/>
-    <p:sldId id="297" r:id="rId62"/>
+    <p:sldId id="328" r:id="rId60"/>
+    <p:sldId id="292" r:id="rId61"/>
+    <p:sldId id="295" r:id="rId62"/>
+    <p:sldId id="297" r:id="rId63"/>
   </p:sldIdLst>
   <p:sldSz cx="9144000" cy="6858000" type="screen4x3"/>
   <p:notesSz cx="6858000" cy="9144000"/>
@@ -252,7 +253,7 @@
           <a:p>
             <a:fld id="{FEA96993-022C-D84D-A802-42D2C34B2DA7}" type="datetimeFigureOut">
               <a:rPr lang="en-US" smtClean="0"/>
-              <a:t>22/06/12</a:t>
+              <a:t>26/06/12</a:t>
             </a:fld>
             <a:endParaRPr lang="en-AU"/>
           </a:p>
@@ -926,6 +927,94 @@
 </p:notes>
 </file>
 
+<file path=ppt/notesSlides/notesSlide4.xml><?xml version="1.0" encoding="utf-8"?>
+<p:notes xmlns:a="http://schemas.openxmlformats.org/drawingml/2006/main" xmlns:r="http://schemas.openxmlformats.org/officeDocument/2006/relationships" xmlns:p="http://schemas.openxmlformats.org/presentationml/2006/main">
+  <p:cSld>
+    <p:spTree>
+      <p:nvGrpSpPr>
+        <p:cNvPr id="1" name=""/>
+        <p:cNvGrpSpPr/>
+        <p:nvPr/>
+      </p:nvGrpSpPr>
+      <p:grpSpPr>
+        <a:xfrm>
+          <a:off x="0" y="0"/>
+          <a:ext cx="0" cy="0"/>
+          <a:chOff x="0" y="0"/>
+          <a:chExt cx="0" cy="0"/>
+        </a:xfrm>
+      </p:grpSpPr>
+      <p:sp>
+        <p:nvSpPr>
+          <p:cNvPr id="2" name="Slide Image Placeholder 1"/>
+          <p:cNvSpPr>
+            <a:spLocks noGrp="1" noRot="1" noChangeAspect="1"/>
+          </p:cNvSpPr>
+          <p:nvPr>
+            <p:ph type="sldImg"/>
+          </p:nvPr>
+        </p:nvSpPr>
+        <p:spPr/>
+      </p:sp>
+      <p:sp>
+        <p:nvSpPr>
+          <p:cNvPr id="3" name="Notes Placeholder 2"/>
+          <p:cNvSpPr>
+            <a:spLocks noGrp="1"/>
+          </p:cNvSpPr>
+          <p:nvPr>
+            <p:ph type="body" idx="1"/>
+          </p:nvPr>
+        </p:nvSpPr>
+        <p:spPr/>
+        <p:txBody>
+          <a:bodyPr/>
+          <a:lstStyle/>
+          <a:p>
+            <a:r>
+              <a:rPr lang="en-AU" dirty="0" smtClean="0"/>
+              <a:t>Need to render route to make a string for the URI to make links in our output.</a:t>
+            </a:r>
+            <a:endParaRPr lang="en-AU" dirty="0"/>
+          </a:p>
+        </p:txBody>
+      </p:sp>
+      <p:sp>
+        <p:nvSpPr>
+          <p:cNvPr id="4" name="Slide Number Placeholder 3"/>
+          <p:cNvSpPr>
+            <a:spLocks noGrp="1"/>
+          </p:cNvSpPr>
+          <p:nvPr>
+            <p:ph type="sldNum" sz="quarter" idx="10"/>
+          </p:nvPr>
+        </p:nvSpPr>
+        <p:spPr/>
+        <p:txBody>
+          <a:bodyPr/>
+          <a:lstStyle/>
+          <a:p>
+            <a:fld id="{921BAFB8-9AF2-B64C-A6AE-0D729299FEBA}" type="slidenum">
+              <a:rPr lang="en-AU" smtClean="0"/>
+              <a:t>28</a:t>
+            </a:fld>
+            <a:endParaRPr lang="en-AU"/>
+          </a:p>
+        </p:txBody>
+      </p:sp>
+    </p:spTree>
+    <p:extLst>
+      <p:ext uri="{BB962C8B-B14F-4D97-AF65-F5344CB8AC3E}">
+        <p14:creationId xmlns:p14="http://schemas.microsoft.com/office/powerpoint/2010/main" val="3954463932"/>
+      </p:ext>
+    </p:extLst>
+  </p:cSld>
+  <p:clrMapOvr>
+    <a:masterClrMapping/>
+  </p:clrMapOvr>
+</p:notes>
+</file>
+
 <file path=ppt/slideLayouts/slideLayout1.xml><?xml version="1.0" encoding="utf-8"?>
 <p:sldLayout xmlns:a="http://schemas.openxmlformats.org/drawingml/2006/main" xmlns:r="http://schemas.openxmlformats.org/officeDocument/2006/relationships" xmlns:p="http://schemas.openxmlformats.org/presentationml/2006/main" showMasterSp="0" type="title" preserve="1">
   <p:cSld name="Title Slide">
@@ -1219,7 +1308,7 @@
             <a:fld id="{23A271A1-F6D6-438B-A432-4747EE7ECD40}" type="datetimeFigureOut">
               <a:rPr lang="en-US" smtClean="0"/>
               <a:pPr algn="ctr" eaLnBrk="1" latinLnBrk="0" hangingPunct="1"/>
-              <a:t>22/06/12</a:t>
+              <a:t>26/06/12</a:t>
             </a:fld>
             <a:endParaRPr lang="en-US" sz="2000" dirty="0">
               <a:solidFill>
@@ -1426,7 +1515,7 @@
             <a:fld id="{23A271A1-F6D6-438B-A432-4747EE7ECD40}" type="datetimeFigureOut">
               <a:rPr lang="en-US" smtClean="0"/>
               <a:pPr eaLnBrk="1" latinLnBrk="0" hangingPunct="1"/>
-              <a:t>22/06/12</a:t>
+              <a:t>26/06/12</a:t>
             </a:fld>
             <a:endParaRPr lang="en-US"/>
           </a:p>
@@ -1614,7 +1703,7 @@
             <a:fld id="{23A271A1-F6D6-438B-A432-4747EE7ECD40}" type="datetimeFigureOut">
               <a:rPr lang="en-US" smtClean="0"/>
               <a:pPr eaLnBrk="1" latinLnBrk="0" hangingPunct="1"/>
-              <a:t>22/06/12</a:t>
+              <a:t>26/06/12</a:t>
             </a:fld>
             <a:endParaRPr lang="en-US" dirty="0"/>
           </a:p>
@@ -1880,7 +1969,7 @@
             <a:fld id="{23A271A1-F6D6-438B-A432-4747EE7ECD40}" type="datetimeFigureOut">
               <a:rPr lang="en-US" smtClean="0"/>
               <a:pPr eaLnBrk="1" latinLnBrk="0" hangingPunct="1"/>
-              <a:t>22/06/12</a:t>
+              <a:t>26/06/12</a:t>
             </a:fld>
             <a:endParaRPr lang="en-US" dirty="0"/>
           </a:p>
@@ -2303,7 +2392,7 @@
             <a:fld id="{23A271A1-F6D6-438B-A432-4747EE7ECD40}" type="datetimeFigureOut">
               <a:rPr lang="en-US" smtClean="0"/>
               <a:pPr eaLnBrk="1" latinLnBrk="0" hangingPunct="1"/>
-              <a:t>22/06/12</a:t>
+              <a:t>26/06/12</a:t>
             </a:fld>
             <a:endParaRPr lang="en-US"/>
           </a:p>
@@ -2553,7 +2642,7 @@
             <a:fld id="{23A271A1-F6D6-438B-A432-4747EE7ECD40}" type="datetimeFigureOut">
               <a:rPr lang="en-US" smtClean="0"/>
               <a:pPr eaLnBrk="1" latinLnBrk="0" hangingPunct="1"/>
-              <a:t>22/06/12</a:t>
+              <a:t>26/06/12</a:t>
             </a:fld>
             <a:endParaRPr lang="en-US"/>
           </a:p>
@@ -2793,7 +2882,7 @@
             <a:fld id="{23A271A1-F6D6-438B-A432-4747EE7ECD40}" type="datetimeFigureOut">
               <a:rPr lang="en-US" smtClean="0"/>
               <a:pPr eaLnBrk="1" latinLnBrk="0" hangingPunct="1"/>
-              <a:t>22/06/12</a:t>
+              <a:t>26/06/12</a:t>
             </a:fld>
             <a:endParaRPr lang="en-US"/>
           </a:p>
@@ -2992,7 +3081,7 @@
             <a:fld id="{23A271A1-F6D6-438B-A432-4747EE7ECD40}" type="datetimeFigureOut">
               <a:rPr lang="en-US" smtClean="0"/>
               <a:pPr eaLnBrk="1" latinLnBrk="0" hangingPunct="1"/>
-              <a:t>22/06/12</a:t>
+              <a:t>26/06/12</a:t>
             </a:fld>
             <a:endParaRPr lang="en-US"/>
           </a:p>
@@ -3097,7 +3186,7 @@
             <a:fld id="{23A271A1-F6D6-438B-A432-4747EE7ECD40}" type="datetimeFigureOut">
               <a:rPr lang="en-US" smtClean="0"/>
               <a:pPr eaLnBrk="1" latinLnBrk="0" hangingPunct="1"/>
-              <a:t>22/06/12</a:t>
+              <a:t>26/06/12</a:t>
             </a:fld>
             <a:endParaRPr lang="en-US"/>
           </a:p>
@@ -3240,7 +3329,7 @@
             <a:fld id="{23A271A1-F6D6-438B-A432-4747EE7ECD40}" type="datetimeFigureOut">
               <a:rPr lang="en-US" smtClean="0"/>
               <a:pPr eaLnBrk="1" latinLnBrk="0" hangingPunct="1"/>
-              <a:t>22/06/12</a:t>
+              <a:t>26/06/12</a:t>
             </a:fld>
             <a:endParaRPr lang="en-US"/>
           </a:p>
@@ -3765,7 +3854,7 @@
             <a:fld id="{23A271A1-F6D6-438B-A432-4747EE7ECD40}" type="datetimeFigureOut">
               <a:rPr lang="en-US" smtClean="0"/>
               <a:pPr eaLnBrk="1" latinLnBrk="0" hangingPunct="1"/>
-              <a:t>22/06/12</a:t>
+              <a:t>26/06/12</a:t>
             </a:fld>
             <a:endParaRPr lang="en-US"/>
           </a:p>
@@ -4030,7 +4119,7 @@
             <a:fld id="{23A271A1-F6D6-438B-A432-4747EE7ECD40}" type="datetimeFigureOut">
               <a:rPr lang="en-US" smtClean="0"/>
               <a:pPr eaLnBrk="1" latinLnBrk="0" hangingPunct="1"/>
-              <a:t>22/06/12</a:t>
+              <a:t>26/06/12</a:t>
             </a:fld>
             <a:endParaRPr lang="en-US" sz="1400" dirty="0">
               <a:solidFill>
@@ -5305,7 +5394,7 @@
         </p:spPr>
         <p:txBody>
           <a:bodyPr>
-            <a:normAutofit fontScale="92500" lnSpcReduction="10000"/>
+            <a:normAutofit/>
           </a:bodyPr>
           <a:lstStyle/>
           <a:p>
@@ -5333,13 +5422,20 @@
             </a:pPr>
             <a:r>
               <a:rPr lang="en-AU" dirty="0" smtClean="0"/>
-              <a:t>Foundation </a:t>
-            </a:r>
-            <a:r>
-              <a:rPr lang="en-AU" dirty="0" err="1"/>
+              <a:t>Configuration: Foundation </a:t>
+            </a:r>
+            <a:r>
+              <a:rPr lang="en-AU" dirty="0" err="1" smtClean="0"/>
               <a:t>Datatype</a:t>
             </a:r>
-            <a:endParaRPr lang="en-AU" dirty="0"/>
+            <a:r>
+              <a:rPr lang="en-AU" dirty="0" smtClean="0"/>
+              <a:t> &amp; Yesod </a:t>
+            </a:r>
+            <a:r>
+              <a:rPr lang="en-AU" dirty="0" smtClean="0"/>
+              <a:t>type class instance</a:t>
+            </a:r>
           </a:p>
           <a:p>
             <a:pPr marL="457200" indent="-457200">
@@ -5348,8 +5444,9 @@
             </a:pPr>
             <a:r>
               <a:rPr lang="en-AU" dirty="0" smtClean="0"/>
-              <a:t>Yesod type class instance</a:t>
-            </a:r>
+              <a:t>Handlers</a:t>
+            </a:r>
+            <a:endParaRPr lang="en-AU" dirty="0" smtClean="0"/>
           </a:p>
           <a:p>
             <a:pPr marL="457200" indent="-457200">
@@ -5358,55 +5455,9 @@
             </a:pPr>
             <a:r>
               <a:rPr lang="en-AU" dirty="0" smtClean="0"/>
-              <a:t>Handlers</a:t>
-            </a:r>
-          </a:p>
-          <a:p>
-            <a:pPr marL="457200" indent="-457200">
-              <a:buFont typeface="Arial"/>
-              <a:buChar char="•"/>
-            </a:pPr>
-            <a:r>
-              <a:rPr lang="en-AU" dirty="0" err="1"/>
-              <a:t>mkYesod</a:t>
-            </a:r>
-            <a:r>
-              <a:rPr lang="en-AU" dirty="0"/>
-              <a:t> &amp; </a:t>
-            </a:r>
-            <a:r>
-              <a:rPr lang="en-AU" dirty="0" err="1" smtClean="0"/>
-              <a:t>parseRoutes</a:t>
-            </a:r>
-            <a:endParaRPr lang="en-AU" dirty="0"/>
-          </a:p>
-          <a:p>
-            <a:pPr marL="457200" indent="-457200">
-              <a:buFont typeface="Arial"/>
-              <a:buChar char="•"/>
-            </a:pPr>
-            <a:r>
-              <a:rPr lang="en-AU" dirty="0" err="1" smtClean="0"/>
-              <a:t>YesodDispatch</a:t>
-            </a:r>
-            <a:r>
-              <a:rPr lang="en-AU" dirty="0" smtClean="0"/>
-              <a:t> </a:t>
-            </a:r>
-          </a:p>
-          <a:p>
-            <a:pPr marL="457200" indent="-457200">
-              <a:buFont typeface="Arial"/>
-              <a:buChar char="•"/>
-            </a:pPr>
-            <a:r>
-              <a:rPr lang="en-AU" dirty="0" err="1" smtClean="0"/>
-              <a:t>YesodRoute</a:t>
+              <a:t>Generated code from our routes definition.</a:t>
             </a:r>
             <a:endParaRPr lang="en-AU" dirty="0" smtClean="0"/>
-          </a:p>
-          <a:p>
-            <a:endParaRPr lang="en-AU" dirty="0"/>
           </a:p>
         </p:txBody>
       </p:sp>
@@ -8020,8 +8071,27 @@
             </a:r>
             <a:r>
               <a:rPr lang="en-AU" dirty="0" smtClean="0"/>
-              <a:t> handler.</a:t>
-            </a:r>
+              <a:t> handler</a:t>
+            </a:r>
+            <a:r>
+              <a:rPr lang="en-AU" dirty="0" smtClean="0"/>
+              <a:t>.</a:t>
+            </a:r>
+          </a:p>
+          <a:p>
+            <a:r>
+              <a:rPr lang="en-AU" dirty="0" err="1" smtClean="0"/>
+              <a:t>HomeR</a:t>
+            </a:r>
+            <a:r>
+              <a:rPr lang="en-AU" dirty="0" smtClean="0"/>
+              <a:t> suffix is just a convention. R stands </a:t>
+            </a:r>
+            <a:r>
+              <a:rPr lang="en-AU" smtClean="0"/>
+              <a:t>for Route.</a:t>
+            </a:r>
+            <a:endParaRPr lang="en-AU" dirty="0" smtClean="0"/>
           </a:p>
           <a:p>
             <a:r>
@@ -8305,7 +8375,7 @@
         </p:spPr>
         <p:txBody>
           <a:bodyPr>
-            <a:normAutofit/>
+            <a:normAutofit lnSpcReduction="10000"/>
           </a:bodyPr>
           <a:lstStyle/>
           <a:p>
@@ -8370,8 +8440,37 @@
               <a:rPr lang="en-AU" sz="2000" dirty="0" smtClean="0">
                 <a:cs typeface="Andale Mono"/>
               </a:rPr>
-              <a:t>Can deploy to fast CGI instead if you don’t trust warp.</a:t>
-            </a:r>
+              <a:t>Can deploy to fast CGI instead if you don’t trust warp</a:t>
+            </a:r>
+            <a:r>
+              <a:rPr lang="en-AU" sz="2000" dirty="0" smtClean="0">
+                <a:cs typeface="Andale Mono"/>
+              </a:rPr>
+              <a:t>.</a:t>
+            </a:r>
+          </a:p>
+          <a:p>
+            <a:r>
+              <a:rPr lang="en-AU" sz="2000" dirty="0" smtClean="0">
+                <a:cs typeface="Andale Mono"/>
+              </a:rPr>
+              <a:t>Warp is not part of </a:t>
+            </a:r>
+            <a:r>
+              <a:rPr lang="en-AU" sz="2000" dirty="0" err="1" smtClean="0">
+                <a:cs typeface="Andale Mono"/>
+              </a:rPr>
+              <a:t>yesod</a:t>
+            </a:r>
+            <a:r>
+              <a:rPr lang="en-AU" sz="2000" dirty="0" smtClean="0">
+                <a:cs typeface="Andale Mono"/>
+              </a:rPr>
+              <a:t>. Is a separate webserver in its own right.</a:t>
+            </a:r>
+            <a:endParaRPr lang="en-AU" sz="2000" dirty="0" smtClean="0">
+              <a:cs typeface="Andale Mono"/>
+            </a:endParaRPr>
           </a:p>
           <a:p>
             <a:endParaRPr lang="en-AU" sz="2000" dirty="0">
@@ -15040,7 +15139,6 @@
               <a:rPr lang="en-AU" dirty="0" smtClean="0"/>
               <a:t> </a:t>
             </a:r>
-            <a:endParaRPr lang="en-AU" dirty="0" smtClean="0"/>
           </a:p>
           <a:p>
             <a:r>
@@ -18131,9 +18229,6 @@
               </a:rPr>
               <a:t> offside indentation rule.</a:t>
             </a:r>
-            <a:endParaRPr lang="en-AU" sz="1800" dirty="0" smtClean="0">
-              <a:cs typeface="Andale Mono"/>
-            </a:endParaRPr>
           </a:p>
           <a:p>
             <a:r>
@@ -18529,10 +18624,10 @@
                 </a:solidFill>
                 <a:latin typeface="Courier"/>
               </a:rPr>
-              <a:t>      </a:t>
-            </a:r>
-            <a:r>
-              <a:rPr lang="en-AU" dirty="0">
+              <a:t>    </a:t>
+            </a:r>
+            <a:r>
+              <a:rPr lang="en-AU" dirty="0" smtClean="0">
                 <a:solidFill>
                   <a:srgbClr val="FF4B31"/>
                 </a:solidFill>
@@ -18576,7 +18671,16 @@
                 </a:solidFill>
                 <a:latin typeface="Courier"/>
               </a:rPr>
-              <a:t>        </a:t>
+              <a:t>    </a:t>
+            </a:r>
+            <a:r>
+              <a:rPr lang="en-AU" dirty="0" smtClean="0">
+                <a:solidFill>
+                  <a:srgbClr val="213E3E"/>
+                </a:solidFill>
+                <a:latin typeface="Courier"/>
+              </a:rPr>
+              <a:t>  </a:t>
             </a:r>
             <a:r>
               <a:rPr lang="en-AU" dirty="0">
@@ -18650,7 +18754,25 @@
                 </a:solidFill>
                 <a:latin typeface="Courier"/>
               </a:rPr>
-              <a:t>          &lt;li&gt;&lt;a href="@{NoteR id}"&gt;#{noteTitle note}&lt;/a&gt;                            </a:t>
+              <a:t>    </a:t>
+            </a:r>
+            <a:r>
+              <a:rPr lang="is-IS" dirty="0" smtClean="0">
+                <a:solidFill>
+                  <a:srgbClr val="213E3E"/>
+                </a:solidFill>
+                <a:latin typeface="Courier"/>
+              </a:rPr>
+              <a:t>    </a:t>
+            </a:r>
+            <a:r>
+              <a:rPr lang="is-IS" dirty="0">
+                <a:solidFill>
+                  <a:srgbClr val="213E3E"/>
+                </a:solidFill>
+                <a:latin typeface="Courier"/>
+              </a:rPr>
+              <a:t>&lt;li&gt;&lt;a href="@{NoteR id}"&gt;#{noteTitle note}&lt;/a&gt;                            </a:t>
             </a:r>
           </a:p>
           <a:p>
@@ -23772,7 +23894,11 @@
             </a:r>
             <a:r>
               <a:rPr lang="en-AU" dirty="0" smtClean="0"/>
-              <a:t> strings un-escaped into a widget. They are just rightfully not in plain sight.. </a:t>
+              <a:t> strings un-escaped into a widget. They are just rightfully not in plain sight</a:t>
+            </a:r>
+            <a:r>
+              <a:rPr lang="en-AU" dirty="0" smtClean="0"/>
+              <a:t>.</a:t>
             </a:r>
             <a:endParaRPr lang="en-AU" dirty="0"/>
           </a:p>
@@ -24028,7 +24154,6 @@
               <a:rPr lang="en-AU" dirty="0" smtClean="0"/>
               <a:t> test. Literal HTML is appended to widget. </a:t>
             </a:r>
-            <a:endParaRPr lang="en-AU" dirty="0" smtClean="0"/>
           </a:p>
           <a:p>
             <a:r>
@@ -24494,7 +24619,23 @@
             </a:r>
             <a:r>
               <a:rPr lang="en-AU" dirty="0" smtClean="0"/>
-              <a:t> ( method of the Widget monad ) does all the magic of appending the CSS,JSS &amp; together.</a:t>
+              <a:t> ( method of the Widget monad ) does all the magic of appending the CSS,</a:t>
+            </a:r>
+            <a:r>
+              <a:rPr lang="en-AU" dirty="0" smtClean="0"/>
+              <a:t>JS </a:t>
+            </a:r>
+            <a:r>
+              <a:rPr lang="en-AU" dirty="0" smtClean="0"/>
+              <a:t>&amp; </a:t>
+            </a:r>
+            <a:r>
+              <a:rPr lang="en-AU" dirty="0" smtClean="0"/>
+              <a:t>HTML together</a:t>
+            </a:r>
+            <a:r>
+              <a:rPr lang="en-AU" dirty="0" smtClean="0"/>
+              <a:t>.</a:t>
             </a:r>
             <a:endParaRPr lang="en-AU" dirty="0"/>
           </a:p>
@@ -26229,13 +26370,49 @@
               <a:t> ( m </a:t>
             </a:r>
             <a:r>
+              <a:rPr lang="en-US" dirty="0" smtClean="0">
+                <a:solidFill>
+                  <a:srgbClr val="FF4B31"/>
+                </a:solidFill>
+                <a:latin typeface="Monaco"/>
+              </a:rPr>
+              <a:t>&gt;=</a:t>
+            </a:r>
+            <a:r>
+              <a:rPr lang="en-US" dirty="0" smtClean="0">
+                <a:solidFill>
+                  <a:srgbClr val="213E3E"/>
+                </a:solidFill>
+                <a:latin typeface="Courier"/>
+              </a:rPr>
+              <a:t> </a:t>
+            </a:r>
+            <a:r>
               <a:rPr lang="en-US" dirty="0">
                 <a:solidFill>
+                  <a:srgbClr val="213E3E"/>
+                </a:solidFill>
+                <a:latin typeface="Courier"/>
+              </a:rPr>
+              <a:t>1</a:t>
+            </a:r>
+            <a:r>
+              <a:rPr lang="en-US" dirty="0" smtClean="0">
+                <a:solidFill>
+                  <a:srgbClr val="213E3E"/>
+                </a:solidFill>
+                <a:latin typeface="Courier"/>
+              </a:rPr>
+              <a:t> </a:t>
+            </a:r>
+            <a:r>
+              <a:rPr lang="en-US" dirty="0">
+                <a:solidFill>
                   <a:srgbClr val="FF4B31"/>
                 </a:solidFill>
                 <a:latin typeface="Monaco"/>
               </a:rPr>
-              <a:t>&gt;</a:t>
+              <a:t>&amp;&amp;</a:t>
             </a:r>
             <a:r>
               <a:rPr lang="en-US" dirty="0">
@@ -26244,43 +26421,43 @@
                 </a:solidFill>
                 <a:latin typeface="Courier"/>
               </a:rPr>
-              <a:t> 0 </a:t>
+              <a:t> m </a:t>
+            </a:r>
+            <a:r>
+              <a:rPr lang="en-US" dirty="0" smtClean="0">
+                <a:solidFill>
+                  <a:srgbClr val="FF4B31"/>
+                </a:solidFill>
+                <a:latin typeface="Monaco"/>
+              </a:rPr>
+              <a:t>&lt;=</a:t>
+            </a:r>
+            <a:r>
+              <a:rPr lang="en-US" dirty="0" smtClean="0">
+                <a:solidFill>
+                  <a:srgbClr val="213E3E"/>
+                </a:solidFill>
+                <a:latin typeface="Courier"/>
+              </a:rPr>
+              <a:t>12</a:t>
+            </a:r>
+            <a:r>
+              <a:rPr lang="en-US" dirty="0" smtClean="0">
+                <a:solidFill>
+                  <a:srgbClr val="213E3E"/>
+                </a:solidFill>
+                <a:latin typeface="Courier"/>
+              </a:rPr>
+              <a:t> </a:t>
             </a:r>
             <a:r>
               <a:rPr lang="en-US" dirty="0">
                 <a:solidFill>
-                  <a:srgbClr val="FF4B31"/>
-                </a:solidFill>
-                <a:latin typeface="Monaco"/>
-              </a:rPr>
-              <a:t>&amp;&amp;</a:t>
-            </a:r>
-            <a:r>
-              <a:rPr lang="en-US" dirty="0">
-                <a:solidFill>
-                  <a:srgbClr val="213E3E"/>
-                </a:solidFill>
-                <a:latin typeface="Courier"/>
-              </a:rPr>
-              <a:t> m </a:t>
-            </a:r>
-            <a:r>
-              <a:rPr lang="en-US" dirty="0">
-                <a:solidFill>
-                  <a:srgbClr val="FF4B31"/>
-                </a:solidFill>
-                <a:latin typeface="Monaco"/>
-              </a:rPr>
-              <a:t>&lt;</a:t>
-            </a:r>
-            <a:r>
-              <a:rPr lang="en-US" dirty="0">
-                <a:solidFill>
-                  <a:srgbClr val="213E3E"/>
-                </a:solidFill>
-                <a:latin typeface="Courier"/>
-              </a:rPr>
-              <a:t> 32 )</a:t>
+                  <a:srgbClr val="213E3E"/>
+                </a:solidFill>
+                <a:latin typeface="Courier"/>
+              </a:rPr>
+              <a:t>)</a:t>
             </a:r>
           </a:p>
           <a:p>
@@ -26660,13 +26837,13 @@
         </p:nvSpPr>
         <p:spPr>
           <a:xfrm>
-            <a:off x="140066" y="1600200"/>
-            <a:ext cx="8889546" cy="5114220"/>
+            <a:off x="268898" y="2845367"/>
+            <a:ext cx="8889546" cy="1340648"/>
           </a:xfrm>
         </p:spPr>
         <p:txBody>
           <a:bodyPr>
-            <a:normAutofit/>
+            <a:normAutofit fontScale="92500" lnSpcReduction="10000"/>
           </a:bodyPr>
           <a:lstStyle/>
           <a:p>
@@ -26785,246 +26962,137 @@
                 </a:solidFill>
                 <a:latin typeface="Monaco"/>
               </a:rPr>
-              <a:t>    In the second argument of `</a:t>
-            </a:r>
-            <a:r>
-              <a:rPr lang="en-AU" sz="1800" dirty="0" err="1">
+              <a:t>    </a:t>
+            </a:r>
+            <a:r>
+              <a:rPr lang="en-AU" sz="1800" dirty="0" smtClean="0">
                 <a:solidFill>
                   <a:srgbClr val="000079"/>
                 </a:solidFill>
                 <a:latin typeface="Monaco"/>
               </a:rPr>
-              <a:t>fmap</a:t>
-            </a:r>
-            <a:r>
-              <a:rPr lang="en-AU" sz="1800" dirty="0">
-                <a:solidFill>
-                  <a:srgbClr val="000079"/>
-                </a:solidFill>
-                <a:latin typeface="Monaco"/>
-              </a:rPr>
-              <a:t>', namely</a:t>
-            </a:r>
-          </a:p>
-          <a:p>
-            <a:pPr marL="0" indent="0">
-              <a:buNone/>
-            </a:pPr>
-            <a:r>
-              <a:rPr lang="en-AU" sz="1800" dirty="0">
-                <a:solidFill>
-                  <a:srgbClr val="000079"/>
-                </a:solidFill>
-                <a:latin typeface="Monaco"/>
-              </a:rPr>
-              <a:t>      `</a:t>
-            </a:r>
-            <a:r>
-              <a:rPr lang="en-AU" sz="1800" dirty="0" err="1">
-                <a:solidFill>
-                  <a:srgbClr val="000079"/>
-                </a:solidFill>
-                <a:latin typeface="Monaco"/>
-              </a:rPr>
-              <a:t>getNoteR</a:t>
-            </a:r>
-            <a:r>
-              <a:rPr lang="en-AU" sz="1800" dirty="0">
-                <a:solidFill>
-                  <a:srgbClr val="000079"/>
-                </a:solidFill>
-                <a:latin typeface="Monaco"/>
-              </a:rPr>
-              <a:t> arg_a6ot arg_a6ou arg_a6ov'</a:t>
-            </a:r>
-          </a:p>
-          <a:p>
-            <a:pPr marL="0" indent="0">
-              <a:buNone/>
-            </a:pPr>
-            <a:r>
-              <a:rPr lang="en-AU" sz="1800" dirty="0">
-                <a:solidFill>
-                  <a:srgbClr val="000079"/>
-                </a:solidFill>
-                <a:latin typeface="Monaco"/>
-              </a:rPr>
-              <a:t>    In the expression:</a:t>
-            </a:r>
-          </a:p>
-          <a:p>
-            <a:pPr marL="0" indent="0">
-              <a:buNone/>
-            </a:pPr>
-            <a:r>
-              <a:rPr lang="en-AU" sz="1800" dirty="0">
-                <a:solidFill>
-                  <a:srgbClr val="000079"/>
-                </a:solidFill>
-                <a:latin typeface="Monaco"/>
-              </a:rPr>
-              <a:t>      </a:t>
-            </a:r>
-            <a:r>
-              <a:rPr lang="en-AU" sz="1800" dirty="0" err="1">
-                <a:solidFill>
-                  <a:srgbClr val="000079"/>
-                </a:solidFill>
-                <a:latin typeface="Monaco"/>
-              </a:rPr>
-              <a:t>fmap</a:t>
-            </a:r>
-            <a:r>
-              <a:rPr lang="en-AU" sz="1800" dirty="0">
-                <a:solidFill>
-                  <a:srgbClr val="000079"/>
-                </a:solidFill>
-                <a:latin typeface="Monaco"/>
-              </a:rPr>
-              <a:t> </a:t>
-            </a:r>
-            <a:r>
-              <a:rPr lang="en-AU" sz="1800" dirty="0" err="1">
-                <a:solidFill>
-                  <a:srgbClr val="000079"/>
-                </a:solidFill>
-                <a:latin typeface="Monaco"/>
-              </a:rPr>
-              <a:t>chooseRep</a:t>
-            </a:r>
-            <a:r>
-              <a:rPr lang="en-AU" sz="1800" dirty="0">
-                <a:solidFill>
-                  <a:srgbClr val="000079"/>
-                </a:solidFill>
-                <a:latin typeface="Monaco"/>
-              </a:rPr>
-              <a:t> (</a:t>
-            </a:r>
-            <a:r>
-              <a:rPr lang="en-AU" sz="1800" dirty="0" err="1">
-                <a:solidFill>
-                  <a:srgbClr val="000079"/>
-                </a:solidFill>
-                <a:latin typeface="Monaco"/>
-              </a:rPr>
-              <a:t>getNoteR</a:t>
-            </a:r>
-            <a:r>
-              <a:rPr lang="en-AU" sz="1800" dirty="0">
-                <a:solidFill>
-                  <a:srgbClr val="000079"/>
-                </a:solidFill>
-                <a:latin typeface="Monaco"/>
-              </a:rPr>
-              <a:t> arg_a6ot arg_a6ou arg_a6ov)</a:t>
-            </a:r>
-          </a:p>
-          <a:p>
-            <a:pPr marL="0" indent="0">
-              <a:buNone/>
-            </a:pPr>
-            <a:r>
-              <a:rPr lang="en-AU" sz="1800" dirty="0">
-                <a:solidFill>
-                  <a:srgbClr val="000079"/>
-                </a:solidFill>
-                <a:latin typeface="Monaco"/>
-              </a:rPr>
-              <a:t>    In the expression:</a:t>
-            </a:r>
-          </a:p>
-          <a:p>
-            <a:pPr marL="0" indent="0">
-              <a:buNone/>
-            </a:pPr>
-            <a:r>
-              <a:rPr lang="en-AU" sz="1800" dirty="0">
-                <a:solidFill>
-                  <a:srgbClr val="000079"/>
-                </a:solidFill>
-                <a:latin typeface="Monaco"/>
-              </a:rPr>
-              <a:t>      \ arg_a6ot arg_a6ou arg_a6ov</a:t>
-            </a:r>
-          </a:p>
-          <a:p>
-            <a:pPr marL="0" indent="0">
-              <a:buNone/>
-            </a:pPr>
-            <a:r>
-              <a:rPr lang="en-AU" sz="1800" dirty="0">
-                <a:solidFill>
-                  <a:srgbClr val="000079"/>
-                </a:solidFill>
-                <a:latin typeface="Monaco"/>
-              </a:rPr>
-              <a:t>        -&gt; </a:t>
-            </a:r>
-            <a:r>
-              <a:rPr lang="en-AU" sz="1800" dirty="0" err="1">
-                <a:solidFill>
-                  <a:srgbClr val="000079"/>
-                </a:solidFill>
-                <a:latin typeface="Monaco"/>
-              </a:rPr>
-              <a:t>fmap</a:t>
-            </a:r>
-            <a:r>
-              <a:rPr lang="en-AU" sz="1800" dirty="0">
-                <a:solidFill>
-                  <a:srgbClr val="000079"/>
-                </a:solidFill>
-                <a:latin typeface="Monaco"/>
-              </a:rPr>
-              <a:t> </a:t>
-            </a:r>
-            <a:r>
-              <a:rPr lang="en-AU" sz="1800" dirty="0" err="1">
-                <a:solidFill>
-                  <a:srgbClr val="000079"/>
-                </a:solidFill>
-                <a:latin typeface="Monaco"/>
-              </a:rPr>
-              <a:t>chooseRep</a:t>
-            </a:r>
-            <a:r>
-              <a:rPr lang="en-AU" sz="1800" dirty="0">
-                <a:solidFill>
-                  <a:srgbClr val="000079"/>
-                </a:solidFill>
-                <a:latin typeface="Monaco"/>
-              </a:rPr>
-              <a:t> (</a:t>
-            </a:r>
-            <a:r>
-              <a:rPr lang="en-AU" sz="1800" dirty="0" err="1">
-                <a:solidFill>
-                  <a:srgbClr val="000079"/>
-                </a:solidFill>
-                <a:latin typeface="Monaco"/>
-              </a:rPr>
-              <a:t>getNoteR</a:t>
-            </a:r>
-            <a:r>
-              <a:rPr lang="en-AU" sz="1800" dirty="0">
-                <a:solidFill>
-                  <a:srgbClr val="000079"/>
-                </a:solidFill>
-                <a:latin typeface="Monaco"/>
-              </a:rPr>
-              <a:t> arg_a6ot arg_a6ou arg_a6ov)</a:t>
-            </a:r>
-          </a:p>
-          <a:p>
-            <a:pPr marL="0" indent="0">
-              <a:buNone/>
-            </a:pPr>
+              <a:t>&lt;snip&gt;</a:t>
+            </a:r>
             <a:endParaRPr lang="fr-FR" sz="1800" dirty="0">
               <a:solidFill>
                 <a:srgbClr val="000079"/>
               </a:solidFill>
               <a:latin typeface="Monaco"/>
+            </a:endParaRPr>
+          </a:p>
+        </p:txBody>
+      </p:sp>
+      <p:sp>
+        <p:nvSpPr>
+          <p:cNvPr id="4" name="TextBox 3"/>
+          <p:cNvSpPr txBox="1"/>
+          <p:nvPr/>
+        </p:nvSpPr>
+        <p:spPr>
+          <a:xfrm>
+            <a:off x="268898" y="1796986"/>
+            <a:ext cx="8153400" cy="646331"/>
+          </a:xfrm>
+          <a:prstGeom prst="rect">
+            <a:avLst/>
+          </a:prstGeom>
+        </p:spPr>
+        <p:style>
+          <a:lnRef idx="2">
+            <a:schemeClr val="accent1"/>
+          </a:lnRef>
+          <a:fillRef idx="1">
+            <a:schemeClr val="lt1"/>
+          </a:fillRef>
+          <a:effectRef idx="0">
+            <a:schemeClr val="accent1"/>
+          </a:effectRef>
+          <a:fontRef idx="minor">
+            <a:schemeClr val="dk1"/>
+          </a:fontRef>
+        </p:style>
+        <p:txBody>
+          <a:bodyPr wrap="square" rtlCol="0">
+            <a:spAutoFit/>
+          </a:bodyPr>
+          <a:lstStyle/>
+          <a:p>
+            <a:r>
+              <a:rPr lang="en-AU" dirty="0" err="1">
+                <a:solidFill>
+                  <a:srgbClr val="000079"/>
+                </a:solidFill>
+                <a:latin typeface="Monaco"/>
+              </a:rPr>
+              <a:t>getNoteR</a:t>
+            </a:r>
+            <a:r>
+              <a:rPr lang="en-AU" dirty="0">
+                <a:solidFill>
+                  <a:srgbClr val="213E3E"/>
+                </a:solidFill>
+                <a:latin typeface="Courier"/>
+              </a:rPr>
+              <a:t> id </a:t>
+            </a:r>
+            <a:r>
+              <a:rPr lang="en-AU" dirty="0">
+                <a:solidFill>
+                  <a:srgbClr val="FF4B31"/>
+                </a:solidFill>
+                <a:latin typeface="Monaco"/>
+              </a:rPr>
+              <a:t>=</a:t>
+            </a:r>
+            <a:r>
+              <a:rPr lang="en-AU" dirty="0">
+                <a:solidFill>
+                  <a:srgbClr val="213E3E"/>
+                </a:solidFill>
+                <a:latin typeface="Courier"/>
+              </a:rPr>
+              <a:t> </a:t>
+            </a:r>
+            <a:r>
+              <a:rPr lang="en-AU" dirty="0">
+                <a:solidFill>
+                  <a:srgbClr val="007EFF"/>
+                </a:solidFill>
+                <a:latin typeface="Monaco"/>
+              </a:rPr>
+              <a:t>do</a:t>
+            </a:r>
+            <a:endParaRPr lang="en-AU" dirty="0">
+              <a:solidFill>
+                <a:srgbClr val="213E3E"/>
+              </a:solidFill>
+              <a:latin typeface="Courier"/>
+            </a:endParaRPr>
+          </a:p>
+          <a:p>
+            <a:r>
+              <a:rPr lang="en-AU" dirty="0">
+                <a:solidFill>
+                  <a:srgbClr val="213E3E"/>
+                </a:solidFill>
+                <a:latin typeface="Courier"/>
+              </a:rPr>
+              <a:t>  </a:t>
+            </a:r>
+            <a:r>
+              <a:rPr lang="x-none" dirty="0" smtClean="0">
+                <a:solidFill>
+                  <a:srgbClr val="213E3E"/>
+                </a:solidFill>
+                <a:latin typeface="Courier"/>
+              </a:rPr>
+              <a:t>-- &lt;snip&gt;</a:t>
+            </a:r>
+            <a:endParaRPr lang="cs-CZ" dirty="0">
+              <a:solidFill>
+                <a:srgbClr val="213E3E"/>
+              </a:solidFill>
+              <a:latin typeface="Courier"/>
             </a:endParaRPr>
           </a:p>
         </p:txBody>
@@ -27099,7 +27167,12 @@
             <p:ph sz="quarter" idx="1"/>
           </p:nvPr>
         </p:nvSpPr>
-        <p:spPr/>
+        <p:spPr>
+          <a:xfrm>
+            <a:off x="95486" y="3886120"/>
+            <a:ext cx="8927963" cy="2668194"/>
+          </a:xfrm>
+        </p:spPr>
         <p:txBody>
           <a:bodyPr>
             <a:normAutofit fontScale="62500" lnSpcReduction="20000"/>
@@ -27155,7 +27228,25 @@
                 </a:solidFill>
                 <a:latin typeface="Monaco"/>
               </a:rPr>
-              <a:t>                with actual type `Month -&gt; </a:t>
+              <a:t>             </a:t>
+            </a:r>
+            <a:r>
+              <a:rPr lang="en-AU" sz="2800" dirty="0" smtClean="0">
+                <a:solidFill>
+                  <a:srgbClr val="000079"/>
+                </a:solidFill>
+                <a:latin typeface="Monaco"/>
+              </a:rPr>
+              <a:t> </a:t>
+            </a:r>
+            <a:r>
+              <a:rPr lang="en-AU" sz="2800" dirty="0">
+                <a:solidFill>
+                  <a:srgbClr val="000079"/>
+                </a:solidFill>
+                <a:latin typeface="Monaco"/>
+              </a:rPr>
+              <a:t>with actual type `Month -&gt; </a:t>
             </a:r>
             <a:r>
               <a:rPr lang="en-AU" sz="2800" dirty="0" err="1">
@@ -27251,135 +27342,538 @@
                 </a:solidFill>
                 <a:latin typeface="Monaco"/>
               </a:rPr>
-              <a:t>    In the first argument of `\ u_a6oL</a:t>
-            </a:r>
-          </a:p>
-          <a:p>
-            <a:pPr marL="0" indent="0">
-              <a:buNone/>
-            </a:pPr>
-            <a:r>
-              <a:rPr lang="hu-HU" sz="2800" dirty="0">
+              <a:t>    </a:t>
+            </a:r>
+            <a:r>
+              <a:rPr lang="en-AU" sz="2800" dirty="0" smtClean="0">
                 <a:solidFill>
                   <a:srgbClr val="000079"/>
                 </a:solidFill>
                 <a:latin typeface="Monaco"/>
               </a:rPr>
-              <a:t>                                -&gt; urender_a6oK u_a6oL []', namely</a:t>
-            </a:r>
-          </a:p>
-          <a:p>
-            <a:pPr marL="0" indent="0">
-              <a:buNone/>
-            </a:pPr>
-            <a:r>
-              <a:rPr lang="fr-FR" sz="2800" dirty="0">
+              <a:t>&lt;snip&gt;</a:t>
+            </a:r>
+            <a:endParaRPr lang="en-AU" dirty="0"/>
+          </a:p>
+        </p:txBody>
+      </p:sp>
+      <p:sp>
+        <p:nvSpPr>
+          <p:cNvPr id="5" name="TextBox 4"/>
+          <p:cNvSpPr txBox="1"/>
+          <p:nvPr/>
+        </p:nvSpPr>
+        <p:spPr>
+          <a:xfrm>
+            <a:off x="261457" y="1680940"/>
+            <a:ext cx="8504591" cy="2308324"/>
+          </a:xfrm>
+          <a:prstGeom prst="rect">
+            <a:avLst/>
+          </a:prstGeom>
+        </p:spPr>
+        <p:style>
+          <a:lnRef idx="2">
+            <a:schemeClr val="accent1"/>
+          </a:lnRef>
+          <a:fillRef idx="1">
+            <a:schemeClr val="lt1"/>
+          </a:fillRef>
+          <a:effectRef idx="0">
+            <a:schemeClr val="accent1"/>
+          </a:effectRef>
+          <a:fontRef idx="minor">
+            <a:schemeClr val="dk1"/>
+          </a:fontRef>
+        </p:style>
+        <p:txBody>
+          <a:bodyPr wrap="square" rtlCol="0">
+            <a:spAutoFit/>
+          </a:bodyPr>
+          <a:lstStyle/>
+          <a:p>
+            <a:r>
+              <a:rPr lang="en-AU" dirty="0" err="1">
                 <a:solidFill>
                   <a:srgbClr val="000079"/>
                 </a:solidFill>
                 <a:latin typeface="Monaco"/>
               </a:rPr>
-              <a:t>      `</a:t>
-            </a:r>
-            <a:r>
-              <a:rPr lang="fr-FR" sz="2800" dirty="0" err="1">
-                <a:solidFill>
-                  <a:srgbClr val="000079"/>
-                </a:solidFill>
-                <a:latin typeface="Monaco"/>
-              </a:rPr>
-              <a:t>NoteR</a:t>
-            </a:r>
-            <a:r>
-              <a:rPr lang="fr-FR" sz="2800" dirty="0">
-                <a:solidFill>
-                  <a:srgbClr val="000079"/>
-                </a:solidFill>
-                <a:latin typeface="Monaco"/>
-              </a:rPr>
-              <a:t> id_a6oI'</a:t>
-            </a:r>
-          </a:p>
-          <a:p>
-            <a:pPr marL="0" indent="0">
-              <a:buNone/>
-            </a:pPr>
-            <a:r>
-              <a:rPr lang="fr-FR" sz="2800" dirty="0">
-                <a:solidFill>
-                  <a:srgbClr val="000079"/>
-                </a:solidFill>
-                <a:latin typeface="Monaco"/>
-              </a:rPr>
-              <a:t>    In the first argument of `</a:t>
-            </a:r>
-            <a:r>
-              <a:rPr lang="fr-FR" sz="2800" dirty="0" err="1">
-                <a:solidFill>
-                  <a:srgbClr val="000079"/>
-                </a:solidFill>
-                <a:latin typeface="Monaco"/>
-              </a:rPr>
-              <a:t>toHtml</a:t>
-            </a:r>
-            <a:r>
-              <a:rPr lang="fr-FR" sz="2800" dirty="0">
-                <a:solidFill>
-                  <a:srgbClr val="000079"/>
-                </a:solidFill>
-                <a:latin typeface="Monaco"/>
-              </a:rPr>
-              <a:t>', </a:t>
-            </a:r>
-            <a:r>
-              <a:rPr lang="fr-FR" sz="2800" dirty="0" err="1">
-                <a:solidFill>
-                  <a:srgbClr val="000079"/>
-                </a:solidFill>
-                <a:latin typeface="Monaco"/>
-              </a:rPr>
-              <a:t>namely</a:t>
-            </a:r>
-            <a:endParaRPr lang="fr-FR" sz="2800" dirty="0">
+              <a:t>showCreateNoteForm</a:t>
+            </a:r>
+            <a:r>
+              <a:rPr lang="en-AU" dirty="0">
+                <a:solidFill>
+                  <a:srgbClr val="213E3E"/>
+                </a:solidFill>
+                <a:latin typeface="Courier"/>
+              </a:rPr>
+              <a:t> widget </a:t>
+            </a:r>
+            <a:r>
+              <a:rPr lang="en-AU" dirty="0" err="1">
+                <a:solidFill>
+                  <a:srgbClr val="213E3E"/>
+                </a:solidFill>
+                <a:latin typeface="Courier"/>
+              </a:rPr>
+              <a:t>encType</a:t>
+            </a:r>
+            <a:r>
+              <a:rPr lang="en-AU" dirty="0">
+                <a:solidFill>
+                  <a:srgbClr val="213E3E"/>
+                </a:solidFill>
+                <a:latin typeface="Courier"/>
+              </a:rPr>
+              <a:t> </a:t>
+            </a:r>
+            <a:r>
+              <a:rPr lang="en-AU" dirty="0">
+                <a:solidFill>
+                  <a:srgbClr val="FF4B31"/>
+                </a:solidFill>
+                <a:latin typeface="Monaco"/>
+              </a:rPr>
+              <a:t>=</a:t>
+            </a:r>
+            <a:r>
+              <a:rPr lang="en-AU" dirty="0">
+                <a:solidFill>
+                  <a:srgbClr val="213E3E"/>
+                </a:solidFill>
+                <a:latin typeface="Courier"/>
+              </a:rPr>
+              <a:t> </a:t>
+            </a:r>
+            <a:r>
+              <a:rPr lang="en-AU" dirty="0">
+                <a:solidFill>
+                  <a:srgbClr val="007EFF"/>
+                </a:solidFill>
+                <a:latin typeface="Monaco"/>
+              </a:rPr>
+              <a:t>do</a:t>
+            </a:r>
+            <a:endParaRPr lang="en-AU" dirty="0">
               <a:solidFill>
-                <a:srgbClr val="000079"/>
+                <a:srgbClr val="213E3E"/>
               </a:solidFill>
-              <a:latin typeface="Monaco"/>
+              <a:latin typeface="Courier"/>
             </a:endParaRPr>
           </a:p>
           <a:p>
-            <a:pPr marL="0" indent="0">
-              <a:buNone/>
-            </a:pPr>
-            <a:r>
-              <a:rPr lang="fr-FR" sz="2800" dirty="0">
-                <a:solidFill>
-                  <a:srgbClr val="000079"/>
-                </a:solidFill>
-                <a:latin typeface="Monaco"/>
-              </a:rPr>
-              <a:t>      `\ u_a6oL -&gt; urender_a6oK u_a6oL [] (</a:t>
-            </a:r>
-            <a:r>
-              <a:rPr lang="fr-FR" sz="2800" dirty="0" err="1">
-                <a:solidFill>
-                  <a:srgbClr val="000079"/>
-                </a:solidFill>
-                <a:latin typeface="Monaco"/>
-              </a:rPr>
-              <a:t>NoteR</a:t>
-            </a:r>
-            <a:r>
-              <a:rPr lang="fr-FR" sz="2800" dirty="0">
-                <a:solidFill>
-                  <a:srgbClr val="000079"/>
-                </a:solidFill>
-                <a:latin typeface="Monaco"/>
-              </a:rPr>
-              <a:t> id_a6oI)'</a:t>
-            </a:r>
-          </a:p>
-          <a:p>
+            <a:r>
+              <a:rPr lang="en-AU" dirty="0">
+                <a:solidFill>
+                  <a:srgbClr val="213E3E"/>
+                </a:solidFill>
+                <a:latin typeface="Courier"/>
+              </a:rPr>
+              <a:t>  notes  </a:t>
+            </a:r>
+            <a:r>
+              <a:rPr lang="en-AU" dirty="0">
+                <a:solidFill>
+                  <a:srgbClr val="FF4B31"/>
+                </a:solidFill>
+                <a:latin typeface="Monaco"/>
+              </a:rPr>
+              <a:t>&lt;-</a:t>
+            </a:r>
+            <a:r>
+              <a:rPr lang="en-AU" dirty="0">
+                <a:solidFill>
+                  <a:srgbClr val="213E3E"/>
+                </a:solidFill>
+                <a:latin typeface="Courier"/>
+              </a:rPr>
+              <a:t> </a:t>
+            </a:r>
+            <a:r>
+              <a:rPr lang="en-AU" dirty="0" err="1">
+                <a:solidFill>
+                  <a:srgbClr val="213E3E"/>
+                </a:solidFill>
+                <a:latin typeface="Courier"/>
+              </a:rPr>
+              <a:t>runDB</a:t>
+            </a:r>
+            <a:r>
+              <a:rPr lang="en-AU" dirty="0">
+                <a:solidFill>
+                  <a:srgbClr val="213E3E"/>
+                </a:solidFill>
+                <a:latin typeface="Courier"/>
+              </a:rPr>
+              <a:t> </a:t>
+            </a:r>
+            <a:r>
+              <a:rPr lang="en-AU" dirty="0">
+                <a:solidFill>
+                  <a:srgbClr val="FF4B31"/>
+                </a:solidFill>
+                <a:latin typeface="Monaco"/>
+              </a:rPr>
+              <a:t>$</a:t>
+            </a:r>
+            <a:r>
+              <a:rPr lang="en-AU" dirty="0">
+                <a:solidFill>
+                  <a:srgbClr val="213E3E"/>
+                </a:solidFill>
+                <a:latin typeface="Courier"/>
+              </a:rPr>
+              <a:t> </a:t>
+            </a:r>
+            <a:r>
+              <a:rPr lang="en-AU" dirty="0" err="1">
+                <a:solidFill>
+                  <a:srgbClr val="213E3E"/>
+                </a:solidFill>
+                <a:latin typeface="Courier"/>
+              </a:rPr>
+              <a:t>selectList</a:t>
+            </a:r>
+            <a:r>
+              <a:rPr lang="en-AU" dirty="0">
+                <a:solidFill>
+                  <a:srgbClr val="213E3E"/>
+                </a:solidFill>
+                <a:latin typeface="Courier"/>
+              </a:rPr>
+              <a:t> </a:t>
+            </a:r>
+            <a:r>
+              <a:rPr lang="en-AU" dirty="0">
+                <a:solidFill>
+                  <a:srgbClr val="D79310"/>
+                </a:solidFill>
+                <a:latin typeface="Monaco"/>
+              </a:rPr>
+              <a:t>[]</a:t>
+            </a:r>
+            <a:r>
+              <a:rPr lang="en-AU" dirty="0">
+                <a:solidFill>
+                  <a:srgbClr val="213E3E"/>
+                </a:solidFill>
+                <a:latin typeface="Courier"/>
+              </a:rPr>
+              <a:t> [</a:t>
+            </a:r>
+            <a:r>
+              <a:rPr lang="en-AU" dirty="0" err="1">
+                <a:solidFill>
+                  <a:srgbClr val="D79310"/>
+                </a:solidFill>
+                <a:latin typeface="Monaco"/>
+              </a:rPr>
+              <a:t>Asc</a:t>
+            </a:r>
+            <a:r>
+              <a:rPr lang="en-AU" dirty="0">
+                <a:solidFill>
+                  <a:srgbClr val="213E3E"/>
+                </a:solidFill>
+                <a:latin typeface="Courier"/>
+              </a:rPr>
+              <a:t> </a:t>
+            </a:r>
+            <a:r>
+              <a:rPr lang="en-AU" dirty="0" err="1">
+                <a:solidFill>
+                  <a:srgbClr val="D79310"/>
+                </a:solidFill>
+                <a:latin typeface="Monaco"/>
+              </a:rPr>
+              <a:t>NoteTitle</a:t>
+            </a:r>
+            <a:r>
+              <a:rPr lang="en-AU" dirty="0">
+                <a:solidFill>
+                  <a:srgbClr val="213E3E"/>
+                </a:solidFill>
+                <a:latin typeface="Courier"/>
+              </a:rPr>
+              <a:t>]</a:t>
+            </a:r>
+          </a:p>
+          <a:p>
+            <a:r>
+              <a:rPr lang="en-AU" dirty="0">
+                <a:solidFill>
+                  <a:srgbClr val="213E3E"/>
+                </a:solidFill>
+                <a:latin typeface="Courier"/>
+              </a:rPr>
+              <a:t>  </a:t>
+            </a:r>
+            <a:r>
+              <a:rPr lang="en-AU" dirty="0" err="1">
+                <a:solidFill>
+                  <a:srgbClr val="213E3E"/>
+                </a:solidFill>
+                <a:latin typeface="Courier"/>
+              </a:rPr>
+              <a:t>defaultLayout</a:t>
+            </a:r>
+            <a:r>
+              <a:rPr lang="en-AU" dirty="0">
+                <a:solidFill>
+                  <a:srgbClr val="213E3E"/>
+                </a:solidFill>
+                <a:latin typeface="Courier"/>
+              </a:rPr>
+              <a:t> [</a:t>
+            </a:r>
+            <a:r>
+              <a:rPr lang="en-AU" dirty="0" err="1">
+                <a:solidFill>
+                  <a:srgbClr val="213E3E"/>
+                </a:solidFill>
+                <a:latin typeface="Courier"/>
+              </a:rPr>
+              <a:t>whamlet</a:t>
+            </a:r>
+            <a:r>
+              <a:rPr lang="en-AU" dirty="0">
+                <a:solidFill>
+                  <a:srgbClr val="FF4B31"/>
+                </a:solidFill>
+                <a:latin typeface="Monaco"/>
+              </a:rPr>
+              <a:t>|</a:t>
+            </a:r>
+            <a:endParaRPr lang="en-AU" dirty="0">
+              <a:solidFill>
+                <a:srgbClr val="213E3E"/>
+              </a:solidFill>
+              <a:latin typeface="Courier"/>
+            </a:endParaRPr>
+          </a:p>
+          <a:p>
+            <a:r>
+              <a:rPr lang="en-AU" dirty="0">
+                <a:solidFill>
+                  <a:srgbClr val="213E3E"/>
+                </a:solidFill>
+                <a:latin typeface="Courier"/>
+              </a:rPr>
+              <a:t>    </a:t>
+            </a:r>
+            <a:r>
+              <a:rPr lang="en-AU" dirty="0">
+                <a:solidFill>
+                  <a:srgbClr val="FF4B31"/>
+                </a:solidFill>
+                <a:latin typeface="Monaco"/>
+              </a:rPr>
+              <a:t>&lt;</a:t>
+            </a:r>
+            <a:r>
+              <a:rPr lang="en-AU" dirty="0">
+                <a:solidFill>
+                  <a:srgbClr val="213E3E"/>
+                </a:solidFill>
+                <a:latin typeface="Courier"/>
+              </a:rPr>
+              <a:t>h1</a:t>
+            </a:r>
+            <a:r>
+              <a:rPr lang="en-AU" dirty="0">
+                <a:solidFill>
+                  <a:srgbClr val="FF4B31"/>
+                </a:solidFill>
+                <a:latin typeface="Monaco"/>
+              </a:rPr>
+              <a:t>&gt;</a:t>
+            </a:r>
+            <a:r>
+              <a:rPr lang="en-AU" dirty="0">
+                <a:solidFill>
+                  <a:srgbClr val="D79310"/>
+                </a:solidFill>
+                <a:latin typeface="Monaco"/>
+              </a:rPr>
+              <a:t>Notes</a:t>
+            </a:r>
+            <a:endParaRPr lang="en-AU" dirty="0">
+              <a:solidFill>
+                <a:srgbClr val="213E3E"/>
+              </a:solidFill>
+              <a:latin typeface="Courier"/>
+            </a:endParaRPr>
+          </a:p>
+          <a:p>
+            <a:r>
+              <a:rPr lang="en-AU" dirty="0">
+                <a:solidFill>
+                  <a:srgbClr val="213E3E"/>
+                </a:solidFill>
+                <a:latin typeface="Courier"/>
+              </a:rPr>
+              <a:t>    </a:t>
+            </a:r>
+            <a:r>
+              <a:rPr lang="en-AU" dirty="0" smtClean="0">
+                <a:solidFill>
+                  <a:srgbClr val="FF4B31"/>
+                </a:solidFill>
+                <a:latin typeface="Monaco"/>
+              </a:rPr>
+              <a:t>&lt;</a:t>
+            </a:r>
+            <a:r>
+              <a:rPr lang="en-AU" dirty="0" err="1">
+                <a:solidFill>
+                  <a:srgbClr val="213E3E"/>
+                </a:solidFill>
+                <a:latin typeface="Courier"/>
+              </a:rPr>
+              <a:t>ul</a:t>
+            </a:r>
+            <a:r>
+              <a:rPr lang="en-AU" dirty="0">
+                <a:solidFill>
+                  <a:srgbClr val="FF4B31"/>
+                </a:solidFill>
+                <a:latin typeface="Monaco"/>
+              </a:rPr>
+              <a:t>&gt;</a:t>
+            </a:r>
+            <a:r>
+              <a:rPr lang="en-AU" dirty="0">
+                <a:solidFill>
+                  <a:srgbClr val="213E3E"/>
+                </a:solidFill>
+                <a:latin typeface="Courier"/>
+              </a:rPr>
+              <a:t>                 </a:t>
+            </a:r>
+          </a:p>
+          <a:p>
+            <a:r>
+              <a:rPr lang="en-AU" dirty="0">
+                <a:solidFill>
+                  <a:srgbClr val="213E3E"/>
+                </a:solidFill>
+                <a:latin typeface="Courier"/>
+              </a:rPr>
+              <a:t>    </a:t>
+            </a:r>
+            <a:r>
+              <a:rPr lang="en-AU" dirty="0" smtClean="0">
+                <a:solidFill>
+                  <a:srgbClr val="213E3E"/>
+                </a:solidFill>
+                <a:latin typeface="Courier"/>
+              </a:rPr>
+              <a:t>  </a:t>
+            </a:r>
+            <a:r>
+              <a:rPr lang="en-AU" dirty="0">
+                <a:solidFill>
+                  <a:srgbClr val="FF4B31"/>
+                </a:solidFill>
+                <a:latin typeface="Monaco"/>
+              </a:rPr>
+              <a:t>$</a:t>
+            </a:r>
+            <a:r>
+              <a:rPr lang="en-AU" dirty="0" err="1">
+                <a:solidFill>
+                  <a:srgbClr val="213E3E"/>
+                </a:solidFill>
+                <a:latin typeface="Courier"/>
+              </a:rPr>
+              <a:t>forall</a:t>
+            </a:r>
+            <a:r>
+              <a:rPr lang="en-AU" dirty="0">
+                <a:solidFill>
+                  <a:srgbClr val="213E3E"/>
+                </a:solidFill>
+                <a:latin typeface="Courier"/>
+              </a:rPr>
+              <a:t> </a:t>
+            </a:r>
+            <a:r>
+              <a:rPr lang="en-AU" dirty="0">
+                <a:solidFill>
+                  <a:srgbClr val="D79310"/>
+                </a:solidFill>
+                <a:latin typeface="Monaco"/>
+              </a:rPr>
+              <a:t>Entity</a:t>
+            </a:r>
+            <a:r>
+              <a:rPr lang="en-AU" dirty="0">
+                <a:solidFill>
+                  <a:srgbClr val="213E3E"/>
+                </a:solidFill>
+                <a:latin typeface="Courier"/>
+              </a:rPr>
+              <a:t> id note </a:t>
+            </a:r>
+            <a:r>
+              <a:rPr lang="en-AU" dirty="0">
+                <a:solidFill>
+                  <a:srgbClr val="FF4B31"/>
+                </a:solidFill>
+                <a:latin typeface="Monaco"/>
+              </a:rPr>
+              <a:t>&lt;-</a:t>
+            </a:r>
+            <a:r>
+              <a:rPr lang="en-AU" dirty="0">
+                <a:solidFill>
+                  <a:srgbClr val="213E3E"/>
+                </a:solidFill>
+                <a:latin typeface="Courier"/>
+              </a:rPr>
+              <a:t> notes</a:t>
+            </a:r>
+          </a:p>
+          <a:p>
+            <a:r>
+              <a:rPr lang="is-IS" dirty="0">
+                <a:solidFill>
+                  <a:srgbClr val="213E3E"/>
+                </a:solidFill>
+                <a:latin typeface="Courier"/>
+              </a:rPr>
+              <a:t>    </a:t>
+            </a:r>
+            <a:r>
+              <a:rPr lang="is-IS" dirty="0" smtClean="0">
+                <a:solidFill>
+                  <a:srgbClr val="213E3E"/>
+                </a:solidFill>
+                <a:latin typeface="Courier"/>
+              </a:rPr>
+              <a:t>    </a:t>
+            </a:r>
+            <a:r>
+              <a:rPr lang="is-IS" dirty="0">
+                <a:solidFill>
+                  <a:srgbClr val="213E3E"/>
+                </a:solidFill>
+                <a:latin typeface="Courier"/>
+              </a:rPr>
+              <a:t>&lt;li&gt;&lt;a href="@{NoteR id}"&gt;#{noteTitle note}&lt;/a&gt;                            </a:t>
+            </a:r>
+          </a:p>
+          <a:p>
+            <a:r>
+              <a:rPr lang="en-US" dirty="0">
+                <a:solidFill>
+                  <a:srgbClr val="213E3E"/>
+                </a:solidFill>
+                <a:latin typeface="Courier"/>
+              </a:rPr>
+              <a:t>    </a:t>
+            </a:r>
             <a:endParaRPr lang="en-AU" dirty="0"/>
           </a:p>
         </p:txBody>
@@ -27456,7 +27950,7 @@
         </p:nvSpPr>
         <p:spPr>
           <a:xfrm>
-            <a:off x="121391" y="1600200"/>
+            <a:off x="121391" y="2992559"/>
             <a:ext cx="8870869" cy="2704873"/>
           </a:xfrm>
         </p:spPr>
@@ -27490,10 +27984,10 @@
                 </a:solidFill>
                 <a:latin typeface="Monaco"/>
               </a:rPr>
-              <a:t>    </a:t>
-            </a:r>
-            <a:r>
-              <a:rPr lang="fr-FR" sz="1800" dirty="0" err="1">
+              <a:t>   </a:t>
+            </a:r>
+            <a:r>
+              <a:rPr lang="fr-FR" sz="1800" dirty="0" err="1" smtClean="0">
                 <a:solidFill>
                   <a:srgbClr val="000079"/>
                 </a:solidFill>
@@ -27502,13 +27996,22 @@
               <a:t>Couldn't</a:t>
             </a:r>
             <a:r>
+              <a:rPr lang="fr-FR" sz="1800" dirty="0" smtClean="0">
+                <a:solidFill>
+                  <a:srgbClr val="000079"/>
+                </a:solidFill>
+                <a:latin typeface="Monaco"/>
+              </a:rPr>
+              <a:t> </a:t>
+            </a:r>
+            <a:r>
               <a:rPr lang="fr-FR" sz="1800" dirty="0">
                 <a:solidFill>
                   <a:srgbClr val="000079"/>
                 </a:solidFill>
                 <a:latin typeface="Monaco"/>
               </a:rPr>
-              <a:t> match type `Key (</a:t>
+              <a:t>match type `Key (</a:t>
             </a:r>
             <a:r>
               <a:rPr lang="fr-FR" sz="1800" dirty="0" err="1">
@@ -27653,7 +28156,7 @@
         </p:nvSpPr>
         <p:spPr>
           <a:xfrm>
-            <a:off x="410861" y="5369669"/>
+            <a:off x="410861" y="1600200"/>
             <a:ext cx="4478848" cy="1200329"/>
           </a:xfrm>
           <a:prstGeom prst="rect">
@@ -27892,7 +28395,7 @@
         </p:nvSpPr>
         <p:spPr>
           <a:xfrm>
-            <a:off x="410861" y="4379780"/>
+            <a:off x="410861" y="5773818"/>
             <a:ext cx="8153400" cy="868487"/>
           </a:xfrm>
           <a:prstGeom prst="rect">
@@ -28477,26 +28980,7 @@
       </p:grpSpPr>
       <p:sp>
         <p:nvSpPr>
-          <p:cNvPr id="2" name="Text Placeholder 1"/>
-          <p:cNvSpPr>
-            <a:spLocks noGrp="1"/>
-          </p:cNvSpPr>
-          <p:nvPr>
-            <p:ph type="body" idx="1"/>
-          </p:nvPr>
-        </p:nvSpPr>
-        <p:spPr/>
-        <p:txBody>
-          <a:bodyPr/>
-          <a:lstStyle/>
-          <a:p>
-            <a:endParaRPr lang="en-AU"/>
-          </a:p>
-        </p:txBody>
-      </p:sp>
-      <p:sp>
-        <p:nvSpPr>
-          <p:cNvPr id="3" name="Title 2"/>
+          <p:cNvPr id="2" name="Title 1"/>
           <p:cNvSpPr>
             <a:spLocks noGrp="1"/>
           </p:cNvSpPr>
@@ -28506,12 +28990,84 @@
         </p:nvSpPr>
         <p:spPr/>
         <p:txBody>
+          <a:bodyPr>
+            <a:normAutofit fontScale="90000"/>
+          </a:bodyPr>
+          <a:lstStyle/>
+          <a:p>
+            <a:r>
+              <a:rPr lang="en-AU" dirty="0" err="1" smtClean="0"/>
+              <a:t>Auth</a:t>
+            </a:r>
+            <a:r>
+              <a:rPr lang="en-AU" dirty="0" smtClean="0"/>
+              <a:t>, Sessions and all the boring bits</a:t>
+            </a:r>
+            <a:endParaRPr lang="en-AU" dirty="0"/>
+          </a:p>
+        </p:txBody>
+      </p:sp>
+      <p:sp>
+        <p:nvSpPr>
+          <p:cNvPr id="3" name="Content Placeholder 2"/>
+          <p:cNvSpPr>
+            <a:spLocks noGrp="1"/>
+          </p:cNvSpPr>
+          <p:nvPr>
+            <p:ph sz="quarter" idx="1"/>
+          </p:nvPr>
+        </p:nvSpPr>
+        <p:spPr/>
+        <p:txBody>
           <a:bodyPr/>
           <a:lstStyle/>
           <a:p>
             <a:r>
               <a:rPr lang="en-AU" dirty="0" smtClean="0"/>
-              <a:t>Questions</a:t>
+              <a:t>Has </a:t>
+            </a:r>
+            <a:r>
+              <a:rPr lang="en-AU" dirty="0" err="1" smtClean="0"/>
+              <a:t>auth</a:t>
+            </a:r>
+            <a:r>
+              <a:rPr lang="en-AU" dirty="0" smtClean="0"/>
+              <a:t> right out of the box.</a:t>
+            </a:r>
+          </a:p>
+          <a:p>
+            <a:pPr lvl="1"/>
+            <a:r>
+              <a:rPr lang="en-AU" dirty="0" smtClean="0"/>
+              <a:t>Google ID</a:t>
+            </a:r>
+          </a:p>
+          <a:p>
+            <a:pPr lvl="1"/>
+            <a:r>
+              <a:rPr lang="en-AU" dirty="0" smtClean="0"/>
+              <a:t>Facebook ID</a:t>
+            </a:r>
+          </a:p>
+          <a:p>
+            <a:pPr lvl="1"/>
+            <a:r>
+              <a:rPr lang="en-AU" dirty="0" err="1" smtClean="0"/>
+              <a:t>BrowserID</a:t>
+            </a:r>
+            <a:endParaRPr lang="en-AU" dirty="0" smtClean="0"/>
+          </a:p>
+          <a:p>
+            <a:pPr lvl="1"/>
+            <a:r>
+              <a:rPr lang="en-AU" dirty="0" smtClean="0"/>
+              <a:t>User/Pass DB auth.</a:t>
+            </a:r>
+          </a:p>
+          <a:p>
+            <a:r>
+              <a:rPr lang="en-AU" dirty="0" smtClean="0"/>
+              <a:t>Also has client side sessions. No server side sessions (this is a good thing).</a:t>
             </a:r>
             <a:endParaRPr lang="en-AU" dirty="0"/>
           </a:p>
@@ -28520,20 +29076,13 @@
     </p:spTree>
     <p:extLst>
       <p:ext uri="{BB962C8B-B14F-4D97-AF65-F5344CB8AC3E}">
-        <p14:creationId xmlns:p14="http://schemas.microsoft.com/office/powerpoint/2010/main" val="1908588342"/>
+        <p14:creationId xmlns:p14="http://schemas.microsoft.com/office/powerpoint/2010/main" val="2959564968"/>
       </p:ext>
     </p:extLst>
   </p:cSld>
   <p:clrMapOvr>
     <a:masterClrMapping/>
   </p:clrMapOvr>
-  <p:timing>
-    <p:tnLst>
-      <p:par>
-        <p:cTn xmlns:p14="http://schemas.microsoft.com/office/powerpoint/2010/main" id="1" dur="indefinite" restart="never" nodeType="tmRoot"/>
-      </p:par>
-    </p:tnLst>
-  </p:timing>
 </p:sld>
 </file>
 
@@ -28701,6 +29250,85 @@
       </p:grpSpPr>
       <p:sp>
         <p:nvSpPr>
+          <p:cNvPr id="2" name="Text Placeholder 1"/>
+          <p:cNvSpPr>
+            <a:spLocks noGrp="1"/>
+          </p:cNvSpPr>
+          <p:nvPr>
+            <p:ph type="body" idx="1"/>
+          </p:nvPr>
+        </p:nvSpPr>
+        <p:spPr/>
+        <p:txBody>
+          <a:bodyPr/>
+          <a:lstStyle/>
+          <a:p>
+            <a:endParaRPr lang="en-AU"/>
+          </a:p>
+        </p:txBody>
+      </p:sp>
+      <p:sp>
+        <p:nvSpPr>
+          <p:cNvPr id="3" name="Title 2"/>
+          <p:cNvSpPr>
+            <a:spLocks noGrp="1"/>
+          </p:cNvSpPr>
+          <p:nvPr>
+            <p:ph type="title"/>
+          </p:nvPr>
+        </p:nvSpPr>
+        <p:spPr/>
+        <p:txBody>
+          <a:bodyPr/>
+          <a:lstStyle/>
+          <a:p>
+            <a:r>
+              <a:rPr lang="en-AU" dirty="0" smtClean="0"/>
+              <a:t>Questions</a:t>
+            </a:r>
+            <a:endParaRPr lang="en-AU" dirty="0"/>
+          </a:p>
+        </p:txBody>
+      </p:sp>
+    </p:spTree>
+    <p:extLst>
+      <p:ext uri="{BB962C8B-B14F-4D97-AF65-F5344CB8AC3E}">
+        <p14:creationId xmlns:p14="http://schemas.microsoft.com/office/powerpoint/2010/main" val="1908588342"/>
+      </p:ext>
+    </p:extLst>
+  </p:cSld>
+  <p:clrMapOvr>
+    <a:masterClrMapping/>
+  </p:clrMapOvr>
+  <p:timing>
+    <p:tnLst>
+      <p:par>
+        <p:cTn xmlns:p14="http://schemas.microsoft.com/office/powerpoint/2010/main" id="1" dur="indefinite" restart="never" nodeType="tmRoot"/>
+      </p:par>
+    </p:tnLst>
+  </p:timing>
+</p:sld>
+</file>
+
+<file path=ppt/slides/slide61.xml><?xml version="1.0" encoding="utf-8"?>
+<p:sld xmlns:a="http://schemas.openxmlformats.org/drawingml/2006/main" xmlns:r="http://schemas.openxmlformats.org/officeDocument/2006/relationships" xmlns:p="http://schemas.openxmlformats.org/presentationml/2006/main">
+  <p:cSld>
+    <p:spTree>
+      <p:nvGrpSpPr>
+        <p:cNvPr id="1" name=""/>
+        <p:cNvGrpSpPr/>
+        <p:nvPr/>
+      </p:nvGrpSpPr>
+      <p:grpSpPr>
+        <a:xfrm>
+          <a:off x="0" y="0"/>
+          <a:ext cx="0" cy="0"/>
+          <a:chOff x="0" y="0"/>
+          <a:chExt cx="0" cy="0"/>
+        </a:xfrm>
+      </p:grpSpPr>
+      <p:sp>
+        <p:nvSpPr>
           <p:cNvPr id="2" name="Title 1"/>
           <p:cNvSpPr>
             <a:spLocks noGrp="1"/>
@@ -28739,11 +29367,7 @@
           <a:p>
             <a:r>
               <a:rPr lang="en-AU" dirty="0" smtClean="0"/>
-              <a:t>Type errors are sometimes tricky to figure out. Forces you to know about the innards of generated code, </a:t>
-            </a:r>
-            <a:r>
-              <a:rPr lang="en-AU" dirty="0" smtClean="0"/>
-              <a:t>sometimes. Is this a necessary evil, or worth it?</a:t>
+              <a:t>Type errors are sometimes tricky to figure out. Forces you to know about the innards of generated code, sometimes. Is this a necessary evil, or worth it?</a:t>
             </a:r>
           </a:p>
           <a:p>
@@ -28785,7 +29409,7 @@
 </p:sld>
 </file>
 
-<file path=ppt/slides/slide61.xml><?xml version="1.0" encoding="utf-8"?>
+<file path=ppt/slides/slide62.xml><?xml version="1.0" encoding="utf-8"?>
 <p:sld xmlns:a="http://schemas.openxmlformats.org/drawingml/2006/main" xmlns:r="http://schemas.openxmlformats.org/officeDocument/2006/relationships" xmlns:p="http://schemas.openxmlformats.org/presentationml/2006/main">
   <p:cSld>
     <p:spTree>

</xml_diff>